<commit_message>
Update to Software Teams theme
</commit_message>
<xml_diff>
--- a/assets/Collegeville21WorkshopImages.pptx
+++ b/assets/Collegeville21WorkshopImages.pptx
@@ -4651,7 +4651,7 @@
         <a:p>
           <a:r>
             <a:rPr lang="en-US" sz="1400" dirty="0"/>
-            <a:t>Recorded invited lectures with small audience, brief Q&amp;A</a:t>
+            <a:t>Record invited lectures with small audience, brief Q&amp;A</a:t>
           </a:r>
         </a:p>
       </dgm:t>
@@ -8476,7 +8476,7 @@
           </a:pPr>
           <a:r>
             <a:rPr lang="en-US" sz="1400" kern="1200" dirty="0"/>
-            <a:t>Recorded invited lectures with small audience, brief Q&amp;A</a:t>
+            <a:t>Record invited lectures with small audience, brief Q&amp;A</a:t>
           </a:r>
         </a:p>
       </dsp:txBody>
@@ -17918,7 +17918,7 @@
           <a:p>
             <a:fld id="{02AC24A9-CCB6-4F8D-B8DB-C2F3692CFA5A}" type="datetimeFigureOut">
               <a:rPr lang="en-US" smtClean="0"/>
-              <a:t>7/20/20</a:t>
+              <a:t>3/27/21</a:t>
             </a:fld>
             <a:endParaRPr lang="en-US" dirty="0"/>
           </a:p>
@@ -18288,7 +18288,7 @@
           <a:p>
             <a:fld id="{02AC24A9-CCB6-4F8D-B8DB-C2F3692CFA5A}" type="datetimeFigureOut">
               <a:rPr lang="en-US" smtClean="0"/>
-              <a:t>7/20/20</a:t>
+              <a:t>3/27/21</a:t>
             </a:fld>
             <a:endParaRPr lang="en-US"/>
           </a:p>
@@ -18497,7 +18497,7 @@
           <a:p>
             <a:fld id="{02AC24A9-CCB6-4F8D-B8DB-C2F3692CFA5A}" type="datetimeFigureOut">
               <a:rPr lang="en-US" smtClean="0"/>
-              <a:t>7/20/20</a:t>
+              <a:t>3/27/21</a:t>
             </a:fld>
             <a:endParaRPr lang="en-US"/>
           </a:p>
@@ -18967,7 +18967,7 @@
           <a:p>
             <a:fld id="{02AC24A9-CCB6-4F8D-B8DB-C2F3692CFA5A}" type="datetimeFigureOut">
               <a:rPr lang="en-US" smtClean="0"/>
-              <a:t>7/20/20</a:t>
+              <a:t>3/27/21</a:t>
             </a:fld>
             <a:endParaRPr lang="en-US"/>
           </a:p>
@@ -19421,7 +19421,7 @@
           <a:p>
             <a:fld id="{02AC24A9-CCB6-4F8D-B8DB-C2F3692CFA5A}" type="datetimeFigureOut">
               <a:rPr lang="en-US" smtClean="0"/>
-              <a:t>7/20/20</a:t>
+              <a:t>3/27/21</a:t>
             </a:fld>
             <a:endParaRPr lang="en-US"/>
           </a:p>
@@ -19953,7 +19953,7 @@
           <a:p>
             <a:fld id="{02AC24A9-CCB6-4F8D-B8DB-C2F3692CFA5A}" type="datetimeFigureOut">
               <a:rPr lang="en-US" smtClean="0"/>
-              <a:t>7/20/20</a:t>
+              <a:t>3/27/21</a:t>
             </a:fld>
             <a:endParaRPr lang="en-US"/>
           </a:p>
@@ -20652,7 +20652,7 @@
           <a:p>
             <a:fld id="{02AC24A9-CCB6-4F8D-B8DB-C2F3692CFA5A}" type="datetimeFigureOut">
               <a:rPr lang="en-US" smtClean="0"/>
-              <a:t>7/20/20</a:t>
+              <a:t>3/27/21</a:t>
             </a:fld>
             <a:endParaRPr lang="en-US"/>
           </a:p>
@@ -20981,7 +20981,7 @@
           <a:p>
             <a:fld id="{02AC24A9-CCB6-4F8D-B8DB-C2F3692CFA5A}" type="datetimeFigureOut">
               <a:rPr lang="en-US" smtClean="0"/>
-              <a:t>7/20/20</a:t>
+              <a:t>3/27/21</a:t>
             </a:fld>
             <a:endParaRPr lang="en-US"/>
           </a:p>
@@ -21094,7 +21094,7 @@
           <a:p>
             <a:fld id="{02AC24A9-CCB6-4F8D-B8DB-C2F3692CFA5A}" type="datetimeFigureOut">
               <a:rPr lang="en-US" smtClean="0"/>
-              <a:t>7/20/20</a:t>
+              <a:t>3/27/21</a:t>
             </a:fld>
             <a:endParaRPr lang="en-US"/>
           </a:p>
@@ -21589,7 +21589,7 @@
           <a:p>
             <a:fld id="{02AC24A9-CCB6-4F8D-B8DB-C2F3692CFA5A}" type="datetimeFigureOut">
               <a:rPr lang="en-US" smtClean="0"/>
-              <a:t>7/20/20</a:t>
+              <a:t>3/27/21</a:t>
             </a:fld>
             <a:endParaRPr lang="en-US" dirty="0"/>
           </a:p>
@@ -22066,7 +22066,7 @@
           <a:p>
             <a:fld id="{02AC24A9-CCB6-4F8D-B8DB-C2F3692CFA5A}" type="datetimeFigureOut">
               <a:rPr lang="en-US" smtClean="0"/>
-              <a:t>7/20/20</a:t>
+              <a:t>3/27/21</a:t>
             </a:fld>
             <a:endParaRPr lang="en-US"/>
           </a:p>
@@ -22309,7 +22309,7 @@
           <a:p>
             <a:fld id="{02AC24A9-CCB6-4F8D-B8DB-C2F3692CFA5A}" type="datetimeFigureOut">
               <a:rPr lang="en-US" smtClean="0"/>
-              <a:t>7/20/20</a:t>
+              <a:t>3/27/21</a:t>
             </a:fld>
             <a:endParaRPr lang="en-US"/>
           </a:p>
@@ -23152,7 +23152,7 @@
                   <a:schemeClr val="bg1"/>
                 </a:solidFill>
               </a:rPr>
-              <a:t>Software Sustainability</a:t>
+              <a:t>Software Teams</a:t>
             </a:r>
             <a:br>
               <a:rPr lang="en-US" sz="3200" dirty="0">
@@ -23594,7 +23594,7 @@
             <p:ph idx="1"/>
             <p:extLst>
               <p:ext uri="{D42A27DB-BD31-4B8C-83A1-F6EECF244321}">
-                <p14:modId xmlns:p14="http://schemas.microsoft.com/office/powerpoint/2010/main" val="3525069762"/>
+                <p14:modId xmlns:p14="http://schemas.microsoft.com/office/powerpoint/2010/main" val="202030499"/>
               </p:ext>
             </p:extLst>
           </p:nvPr>
@@ -24083,7 +24083,7 @@
             </a:br>
             <a:r>
               <a:rPr lang="en-US" sz="1800" dirty="0"/>
-              <a:t>July 21 – 23, 2020</a:t>
+              <a:t>July 20 – 22, 2021</a:t>
             </a:r>
             <a:endParaRPr lang="en-US" dirty="0"/>
           </a:p>
@@ -24197,7 +24197,7 @@
             <p:ph idx="1"/>
             <p:extLst>
               <p:ext uri="{D42A27DB-BD31-4B8C-83A1-F6EECF244321}">
-                <p14:modId xmlns:p14="http://schemas.microsoft.com/office/powerpoint/2010/main" val="182439641"/>
+                <p14:modId xmlns:p14="http://schemas.microsoft.com/office/powerpoint/2010/main" val="293481277"/>
               </p:ext>
             </p:extLst>
           </p:nvPr>
@@ -24307,7 +24307,7 @@
                             </a:schemeClr>
                           </a:solidFill>
                         </a:rPr>
-                        <a:t>July 21: Productivity Definitions &amp; Challenges</a:t>
+                        <a:t>July 21: Teams Definitions &amp; Challenges</a:t>
                       </a:r>
                     </a:p>
                   </a:txBody>
@@ -24353,7 +24353,7 @@
                             </a:schemeClr>
                           </a:solidFill>
                         </a:rPr>
-                        <a:t>July 22: Technical Approaches to Improve Productivity</a:t>
+                        <a:t>July 22: Technical Approaches to Improve Teams</a:t>
                       </a:r>
                     </a:p>
                   </a:txBody>
@@ -24395,7 +24395,7 @@
                             </a:schemeClr>
                           </a:solidFill>
                         </a:rPr>
-                        <a:t>July 23: Cultural Approaches to Improve Productivity</a:t>
+                        <a:t>July 23: Cultural Approaches to Improve Teams</a:t>
                       </a:r>
                     </a:p>
                   </a:txBody>
@@ -25601,7 +25601,7 @@
             </a:r>
             <a:r>
               <a:rPr lang="en-US" sz="2000" dirty="0"/>
-              <a:t>Single Zoom meeting with breakout rooms </a:t>
+              <a:t>Single Spatial Chat meeting with multiple rooms </a:t>
             </a:r>
             <a:endParaRPr lang="en-US" sz="3700" dirty="0"/>
           </a:p>
@@ -26067,7 +26067,7 @@
             </a:r>
             <a:r>
               <a:rPr lang="en-US" sz="2200" dirty="0"/>
-              <a:t>Single Zoom meeting with breakout rooms</a:t>
+              <a:t>Single Spatial Chat meeting with multiple rooms</a:t>
             </a:r>
             <a:endParaRPr lang="en-US" dirty="0"/>
           </a:p>
@@ -26267,7 +26267,15 @@
             </a:r>
             <a:r>
               <a:rPr lang="en-US" sz="2200" dirty="0"/>
-              <a:t>Single Zoom meeting with breakout rooms</a:t>
+              <a:t>Single Spatial Chat meeting with </a:t>
+            </a:r>
+            <a:r>
+              <a:rPr lang="en-US" sz="2200" dirty="0" err="1"/>
+              <a:t>multipe</a:t>
+            </a:r>
+            <a:r>
+              <a:rPr lang="en-US" sz="2200" dirty="0"/>
+              <a:t> rooms</a:t>
             </a:r>
             <a:endParaRPr lang="en-US" dirty="0"/>
           </a:p>

</xml_diff>